<commit_message>
nueva introduccion y teoria
</commit_message>
<xml_diff>
--- a/input/images/app_mod.pptx
+++ b/input/images/app_mod.pptx
@@ -243,7 +243,7 @@
           <a:p>
             <a:fld id="{54FB5702-4C46-4803-8640-AC94616135D0}" type="datetimeFigureOut">
               <a:rPr lang="es-CL" smtClean="0"/>
-              <a:t>25-07-2020</a:t>
+              <a:t>24-08-2020</a:t>
             </a:fld>
             <a:endParaRPr lang="es-CL"/>
           </a:p>
@@ -413,7 +413,7 @@
           <a:p>
             <a:fld id="{54FB5702-4C46-4803-8640-AC94616135D0}" type="datetimeFigureOut">
               <a:rPr lang="es-CL" smtClean="0"/>
-              <a:t>25-07-2020</a:t>
+              <a:t>24-08-2020</a:t>
             </a:fld>
             <a:endParaRPr lang="es-CL"/>
           </a:p>
@@ -593,7 +593,7 @@
           <a:p>
             <a:fld id="{54FB5702-4C46-4803-8640-AC94616135D0}" type="datetimeFigureOut">
               <a:rPr lang="es-CL" smtClean="0"/>
-              <a:t>25-07-2020</a:t>
+              <a:t>24-08-2020</a:t>
             </a:fld>
             <a:endParaRPr lang="es-CL"/>
           </a:p>
@@ -763,7 +763,7 @@
           <a:p>
             <a:fld id="{54FB5702-4C46-4803-8640-AC94616135D0}" type="datetimeFigureOut">
               <a:rPr lang="es-CL" smtClean="0"/>
-              <a:t>25-07-2020</a:t>
+              <a:t>24-08-2020</a:t>
             </a:fld>
             <a:endParaRPr lang="es-CL"/>
           </a:p>
@@ -1009,7 +1009,7 @@
           <a:p>
             <a:fld id="{54FB5702-4C46-4803-8640-AC94616135D0}" type="datetimeFigureOut">
               <a:rPr lang="es-CL" smtClean="0"/>
-              <a:t>25-07-2020</a:t>
+              <a:t>24-08-2020</a:t>
             </a:fld>
             <a:endParaRPr lang="es-CL"/>
           </a:p>
@@ -1241,7 +1241,7 @@
           <a:p>
             <a:fld id="{54FB5702-4C46-4803-8640-AC94616135D0}" type="datetimeFigureOut">
               <a:rPr lang="es-CL" smtClean="0"/>
-              <a:t>25-07-2020</a:t>
+              <a:t>24-08-2020</a:t>
             </a:fld>
             <a:endParaRPr lang="es-CL"/>
           </a:p>
@@ -1608,7 +1608,7 @@
           <a:p>
             <a:fld id="{54FB5702-4C46-4803-8640-AC94616135D0}" type="datetimeFigureOut">
               <a:rPr lang="es-CL" smtClean="0"/>
-              <a:t>25-07-2020</a:t>
+              <a:t>24-08-2020</a:t>
             </a:fld>
             <a:endParaRPr lang="es-CL"/>
           </a:p>
@@ -1726,7 +1726,7 @@
           <a:p>
             <a:fld id="{54FB5702-4C46-4803-8640-AC94616135D0}" type="datetimeFigureOut">
               <a:rPr lang="es-CL" smtClean="0"/>
-              <a:t>25-07-2020</a:t>
+              <a:t>24-08-2020</a:t>
             </a:fld>
             <a:endParaRPr lang="es-CL"/>
           </a:p>
@@ -1821,7 +1821,7 @@
           <a:p>
             <a:fld id="{54FB5702-4C46-4803-8640-AC94616135D0}" type="datetimeFigureOut">
               <a:rPr lang="es-CL" smtClean="0"/>
-              <a:t>25-07-2020</a:t>
+              <a:t>24-08-2020</a:t>
             </a:fld>
             <a:endParaRPr lang="es-CL"/>
           </a:p>
@@ -2098,7 +2098,7 @@
           <a:p>
             <a:fld id="{54FB5702-4C46-4803-8640-AC94616135D0}" type="datetimeFigureOut">
               <a:rPr lang="es-CL" smtClean="0"/>
-              <a:t>25-07-2020</a:t>
+              <a:t>24-08-2020</a:t>
             </a:fld>
             <a:endParaRPr lang="es-CL"/>
           </a:p>
@@ -2355,7 +2355,7 @@
           <a:p>
             <a:fld id="{54FB5702-4C46-4803-8640-AC94616135D0}" type="datetimeFigureOut">
               <a:rPr lang="es-CL" smtClean="0"/>
-              <a:t>25-07-2020</a:t>
+              <a:t>24-08-2020</a:t>
             </a:fld>
             <a:endParaRPr lang="es-CL"/>
           </a:p>
@@ -2568,7 +2568,7 @@
           <a:p>
             <a:fld id="{54FB5702-4C46-4803-8640-AC94616135D0}" type="datetimeFigureOut">
               <a:rPr lang="es-CL" smtClean="0"/>
-              <a:t>25-07-2020</a:t>
+              <a:t>24-08-2020</a:t>
             </a:fld>
             <a:endParaRPr lang="es-CL"/>
           </a:p>
@@ -2975,10 +2975,10 @@
       </p:grpSpPr>
       <p:sp>
         <p:nvSpPr>
-          <p:cNvPr id="4" name="CuadroTexto 3">
+          <p:cNvPr id="6" name="CuadroTexto 5">
             <a:extLst>
               <a:ext uri="{FF2B5EF4-FFF2-40B4-BE49-F238E27FC236}">
-                <a16:creationId xmlns:a16="http://schemas.microsoft.com/office/drawing/2014/main" id="{1084C545-B612-4877-BD2E-413B8C1D5A45}"/>
+                <a16:creationId xmlns:a16="http://schemas.microsoft.com/office/drawing/2014/main" id="{39BD3987-8126-4CD0-A7D0-72C2204A8D37}"/>
               </a:ext>
             </a:extLst>
           </p:cNvPr>
@@ -2987,13 +2987,13 @@
         </p:nvSpPr>
         <p:spPr>
           <a:xfrm>
-            <a:off x="2188333" y="2368477"/>
-            <a:ext cx="1637095" cy="499880"/>
+            <a:off x="3064852" y="2520232"/>
+            <a:ext cx="2238183" cy="499880"/>
           </a:xfrm>
           <a:prstGeom prst="rect">
             <a:avLst/>
           </a:prstGeom>
-          <a:ln w="28575"/>
+          <a:ln w="3175"/>
         </p:spPr>
         <p:style>
           <a:lnRef idx="2">
@@ -3017,21 +3017,31 @@
           <a:p>
             <a:pPr algn="ctr"/>
             <a:r>
-              <a:rPr lang="es-CL" sz="1324">
+              <a:rPr lang="es-CL" sz="1324" dirty="0">
                 <a:latin typeface="Times New Roman" panose="02020603050405020304" pitchFamily="18" charset="0"/>
                 <a:cs typeface="Times New Roman" panose="02020603050405020304" pitchFamily="18" charset="0"/>
               </a:rPr>
-              <a:t>Cantidad de libros en el hogar</a:t>
-            </a:r>
-          </a:p>
-        </p:txBody>
-      </p:sp>
-      <p:sp>
-        <p:nvSpPr>
-          <p:cNvPr id="6" name="CuadroTexto 5">
+              <a:t>Interés político del</a:t>
+            </a:r>
+          </a:p>
+          <a:p>
+            <a:pPr algn="ctr"/>
+            <a:r>
+              <a:rPr lang="es-CL" sz="1324" dirty="0">
+                <a:latin typeface="Times New Roman" panose="02020603050405020304" pitchFamily="18" charset="0"/>
+                <a:cs typeface="Times New Roman" panose="02020603050405020304" pitchFamily="18" charset="0"/>
+              </a:rPr>
+              <a:t> estudiante</a:t>
+            </a:r>
+          </a:p>
+        </p:txBody>
+      </p:sp>
+      <p:sp>
+        <p:nvSpPr>
+          <p:cNvPr id="7" name="CuadroTexto 6">
             <a:extLst>
               <a:ext uri="{FF2B5EF4-FFF2-40B4-BE49-F238E27FC236}">
-                <a16:creationId xmlns:a16="http://schemas.microsoft.com/office/drawing/2014/main" id="{39BD3987-8126-4CD0-A7D0-72C2204A8D37}"/>
+                <a16:creationId xmlns:a16="http://schemas.microsoft.com/office/drawing/2014/main" id="{D6101E3F-6D4B-4818-BB8A-5AFD02D8E365}"/>
               </a:ext>
             </a:extLst>
           </p:cNvPr>
@@ -3040,7 +3050,7 @@
         </p:nvSpPr>
         <p:spPr>
           <a:xfrm>
-            <a:off x="4326784" y="1080876"/>
+            <a:off x="3064851" y="1301699"/>
             <a:ext cx="2238183" cy="499880"/>
           </a:xfrm>
           <a:prstGeom prst="rect">
@@ -3074,69 +3084,6 @@
                 <a:latin typeface="Times New Roman" panose="02020603050405020304" pitchFamily="18" charset="0"/>
                 <a:cs typeface="Times New Roman" panose="02020603050405020304" pitchFamily="18" charset="0"/>
               </a:rPr>
-              <a:t>Interés político del</a:t>
-            </a:r>
-          </a:p>
-          <a:p>
-            <a:pPr algn="ctr"/>
-            <a:r>
-              <a:rPr lang="es-CL" sz="1324" dirty="0">
-                <a:latin typeface="Times New Roman" panose="02020603050405020304" pitchFamily="18" charset="0"/>
-                <a:cs typeface="Times New Roman" panose="02020603050405020304" pitchFamily="18" charset="0"/>
-              </a:rPr>
-              <a:t> estudiante</a:t>
-            </a:r>
-          </a:p>
-        </p:txBody>
-      </p:sp>
-      <p:sp>
-        <p:nvSpPr>
-          <p:cNvPr id="7" name="CuadroTexto 6">
-            <a:extLst>
-              <a:ext uri="{FF2B5EF4-FFF2-40B4-BE49-F238E27FC236}">
-                <a16:creationId xmlns:a16="http://schemas.microsoft.com/office/drawing/2014/main" id="{D6101E3F-6D4B-4818-BB8A-5AFD02D8E365}"/>
-              </a:ext>
-            </a:extLst>
-          </p:cNvPr>
-          <p:cNvSpPr txBox="1"/>
-          <p:nvPr/>
-        </p:nvSpPr>
-        <p:spPr>
-          <a:xfrm>
-            <a:off x="4326784" y="2368477"/>
-            <a:ext cx="2238183" cy="499880"/>
-          </a:xfrm>
-          <a:prstGeom prst="rect">
-            <a:avLst/>
-          </a:prstGeom>
-          <a:ln w="28575"/>
-        </p:spPr>
-        <p:style>
-          <a:lnRef idx="2">
-            <a:schemeClr val="dk1"/>
-          </a:lnRef>
-          <a:fillRef idx="1">
-            <a:schemeClr val="lt1"/>
-          </a:fillRef>
-          <a:effectRef idx="0">
-            <a:schemeClr val="dk1"/>
-          </a:effectRef>
-          <a:fontRef idx="minor">
-            <a:schemeClr val="dk1"/>
-          </a:fontRef>
-        </p:style>
-        <p:txBody>
-          <a:bodyPr wrap="square" rtlCol="0">
-            <a:spAutoFit/>
-          </a:bodyPr>
-          <a:lstStyle/>
-          <a:p>
-            <a:pPr algn="ctr"/>
-            <a:r>
-              <a:rPr lang="es-CL" sz="1324" dirty="0">
-                <a:latin typeface="Times New Roman" panose="02020603050405020304" pitchFamily="18" charset="0"/>
-                <a:cs typeface="Times New Roman" panose="02020603050405020304" pitchFamily="18" charset="0"/>
-              </a:rPr>
               <a:t>Habilidades en el manejo del lenguaje del estudiante</a:t>
             </a:r>
           </a:p>
@@ -3153,15 +3100,15 @@
           </p:cNvPr>
           <p:cNvCxnSpPr>
             <a:cxnSpLocks/>
-            <a:stCxn id="4" idx="3"/>
+            <a:stCxn id="130" idx="3"/>
             <a:endCxn id="7" idx="1"/>
           </p:cNvCxnSpPr>
           <p:nvPr/>
         </p:nvCxnSpPr>
         <p:spPr>
-          <a:xfrm>
-            <a:off x="3825427" y="2618417"/>
-            <a:ext cx="501356" cy="0"/>
+          <a:xfrm flipV="1">
+            <a:off x="1750306" y="1551639"/>
+            <a:ext cx="1314545" cy="491121"/>
           </a:xfrm>
           <a:prstGeom prst="straightConnector1">
             <a:avLst/>
@@ -3188,49 +3135,6 @@
           </a:fontRef>
         </p:style>
       </p:cxnSp>
-      <p:cxnSp>
-        <p:nvCxnSpPr>
-          <p:cNvPr id="20" name="Conector recto de flecha 19">
-            <a:extLst>
-              <a:ext uri="{FF2B5EF4-FFF2-40B4-BE49-F238E27FC236}">
-                <a16:creationId xmlns:a16="http://schemas.microsoft.com/office/drawing/2014/main" id="{741CE5BF-9E7D-4BFB-995E-A0BFBC4E0394}"/>
-              </a:ext>
-            </a:extLst>
-          </p:cNvPr>
-          <p:cNvCxnSpPr>
-            <a:cxnSpLocks/>
-            <a:stCxn id="118" idx="3"/>
-            <a:endCxn id="6" idx="1"/>
-          </p:cNvCxnSpPr>
-          <p:nvPr/>
-        </p:nvCxnSpPr>
-        <p:spPr>
-          <a:xfrm flipV="1">
-            <a:off x="3825427" y="1330817"/>
-            <a:ext cx="501356" cy="1"/>
-          </a:xfrm>
-          <a:prstGeom prst="straightConnector1">
-            <a:avLst/>
-          </a:prstGeom>
-          <a:ln>
-            <a:tailEnd type="triangle"/>
-          </a:ln>
-        </p:spPr>
-        <p:style>
-          <a:lnRef idx="1">
-            <a:schemeClr val="dk1"/>
-          </a:lnRef>
-          <a:fillRef idx="0">
-            <a:schemeClr val="dk1"/>
-          </a:fillRef>
-          <a:effectRef idx="0">
-            <a:schemeClr val="dk1"/>
-          </a:effectRef>
-          <a:fontRef idx="minor">
-            <a:schemeClr val="tx1"/>
-          </a:fontRef>
-        </p:style>
-      </p:cxnSp>
       <p:sp>
         <p:nvSpPr>
           <p:cNvPr id="42" name="CuadroTexto 41">
@@ -3245,7 +3149,7 @@
         </p:nvSpPr>
         <p:spPr>
           <a:xfrm>
-            <a:off x="6996191" y="1761424"/>
+            <a:off x="6888724" y="1663503"/>
             <a:ext cx="2147809" cy="703654"/>
           </a:xfrm>
           <a:prstGeom prst="rect">
@@ -3301,9 +3205,9 @@
           <p:nvPr/>
         </p:nvCxnSpPr>
         <p:spPr>
-          <a:xfrm>
-            <a:off x="6564966" y="1330817"/>
-            <a:ext cx="431224" cy="782435"/>
+          <a:xfrm flipV="1">
+            <a:off x="5303035" y="2015330"/>
+            <a:ext cx="1585689" cy="754842"/>
           </a:xfrm>
           <a:prstGeom prst="straightConnector1">
             <a:avLst/>
@@ -3344,9 +3248,9 @@
           <p:nvPr/>
         </p:nvCxnSpPr>
         <p:spPr>
-          <a:xfrm flipV="1">
-            <a:off x="6564966" y="2113251"/>
-            <a:ext cx="431224" cy="505166"/>
+          <a:xfrm>
+            <a:off x="5303034" y="1551639"/>
+            <a:ext cx="1585690" cy="463691"/>
           </a:xfrm>
           <a:prstGeom prst="straightConnector1">
             <a:avLst/>
@@ -3375,10 +3279,10 @@
       </p:cxnSp>
       <p:sp>
         <p:nvSpPr>
-          <p:cNvPr id="118" name="CuadroTexto 117">
+          <p:cNvPr id="130" name="CuadroTexto 129">
             <a:extLst>
               <a:ext uri="{FF2B5EF4-FFF2-40B4-BE49-F238E27FC236}">
-                <a16:creationId xmlns:a16="http://schemas.microsoft.com/office/drawing/2014/main" id="{6DBF5CFB-B2A6-4F77-BE24-7A4C7F874EF5}"/>
+                <a16:creationId xmlns:a16="http://schemas.microsoft.com/office/drawing/2014/main" id="{14428794-59CD-4165-929E-541599B25F54}"/>
               </a:ext>
             </a:extLst>
           </p:cNvPr>
@@ -3387,8 +3291,8 @@
         </p:nvSpPr>
         <p:spPr>
           <a:xfrm>
-            <a:off x="2188333" y="1080877"/>
-            <a:ext cx="1637095" cy="499880"/>
+            <a:off x="164617" y="1690933"/>
+            <a:ext cx="1585689" cy="703654"/>
           </a:xfrm>
           <a:prstGeom prst="rect">
             <a:avLst/>
@@ -3421,59 +3325,6 @@
                 <a:latin typeface="Times New Roman" panose="02020603050405020304" pitchFamily="18" charset="0"/>
                 <a:cs typeface="Times New Roman" panose="02020603050405020304" pitchFamily="18" charset="0"/>
               </a:rPr>
-              <a:t>Interés político de los padres </a:t>
-            </a:r>
-          </a:p>
-        </p:txBody>
-      </p:sp>
-      <p:sp>
-        <p:nvSpPr>
-          <p:cNvPr id="130" name="CuadroTexto 129">
-            <a:extLst>
-              <a:ext uri="{FF2B5EF4-FFF2-40B4-BE49-F238E27FC236}">
-                <a16:creationId xmlns:a16="http://schemas.microsoft.com/office/drawing/2014/main" id="{14428794-59CD-4165-929E-541599B25F54}"/>
-              </a:ext>
-            </a:extLst>
-          </p:cNvPr>
-          <p:cNvSpPr txBox="1"/>
-          <p:nvPr/>
-        </p:nvSpPr>
-        <p:spPr>
-          <a:xfrm>
-            <a:off x="0" y="1662516"/>
-            <a:ext cx="1347537" cy="703654"/>
-          </a:xfrm>
-          <a:prstGeom prst="rect">
-            <a:avLst/>
-          </a:prstGeom>
-          <a:ln w="28575"/>
-        </p:spPr>
-        <p:style>
-          <a:lnRef idx="2">
-            <a:schemeClr val="dk1"/>
-          </a:lnRef>
-          <a:fillRef idx="1">
-            <a:schemeClr val="lt1"/>
-          </a:fillRef>
-          <a:effectRef idx="0">
-            <a:schemeClr val="dk1"/>
-          </a:effectRef>
-          <a:fontRef idx="minor">
-            <a:schemeClr val="dk1"/>
-          </a:fontRef>
-        </p:style>
-        <p:txBody>
-          <a:bodyPr wrap="square" rtlCol="0">
-            <a:spAutoFit/>
-          </a:bodyPr>
-          <a:lstStyle/>
-          <a:p>
-            <a:pPr algn="ctr"/>
-            <a:r>
-              <a:rPr lang="es-CL" sz="1324" dirty="0">
-                <a:latin typeface="Times New Roman" panose="02020603050405020304" pitchFamily="18" charset="0"/>
-                <a:cs typeface="Times New Roman" panose="02020603050405020304" pitchFamily="18" charset="0"/>
-              </a:rPr>
               <a:t>Estatus socioeconómico de los padres</a:t>
             </a:r>
           </a:p>
@@ -3491,19 +3342,19 @@
           <p:cNvCxnSpPr>
             <a:cxnSpLocks/>
             <a:stCxn id="130" idx="3"/>
-            <a:endCxn id="118" idx="1"/>
+            <a:endCxn id="6" idx="1"/>
           </p:cNvCxnSpPr>
           <p:nvPr/>
         </p:nvCxnSpPr>
         <p:spPr>
-          <a:xfrm flipV="1">
-            <a:off x="1347536" y="1330817"/>
-            <a:ext cx="840796" cy="683526"/>
+          <a:xfrm>
+            <a:off x="1750306" y="2042760"/>
+            <a:ext cx="1314546" cy="727412"/>
           </a:xfrm>
           <a:prstGeom prst="straightConnector1">
             <a:avLst/>
           </a:prstGeom>
-          <a:ln>
+          <a:ln w="3175">
             <a:headEnd type="none" w="med" len="med"/>
             <a:tailEnd type="none" w="med" len="med"/>
           </a:ln>
@@ -3523,52 +3374,6 @@
           </a:fontRef>
         </p:style>
       </p:cxnSp>
-      <p:cxnSp>
-        <p:nvCxnSpPr>
-          <p:cNvPr id="134" name="Conector recto de flecha 133">
-            <a:extLst>
-              <a:ext uri="{FF2B5EF4-FFF2-40B4-BE49-F238E27FC236}">
-                <a16:creationId xmlns:a16="http://schemas.microsoft.com/office/drawing/2014/main" id="{CE2C49C2-E528-4899-BB6C-2C3D61BB7D9F}"/>
-              </a:ext>
-            </a:extLst>
-          </p:cNvPr>
-          <p:cNvCxnSpPr>
-            <a:cxnSpLocks/>
-            <a:stCxn id="130" idx="3"/>
-            <a:endCxn id="4" idx="1"/>
-          </p:cNvCxnSpPr>
-          <p:nvPr/>
-        </p:nvCxnSpPr>
-        <p:spPr>
-          <a:xfrm>
-            <a:off x="1347536" y="2014343"/>
-            <a:ext cx="840796" cy="604074"/>
-          </a:xfrm>
-          <a:prstGeom prst="straightConnector1">
-            <a:avLst/>
-          </a:prstGeom>
-          <a:ln>
-            <a:solidFill>
-              <a:schemeClr val="tx1"/>
-            </a:solidFill>
-            <a:tailEnd type="triangle"/>
-          </a:ln>
-        </p:spPr>
-        <p:style>
-          <a:lnRef idx="3">
-            <a:schemeClr val="accent2"/>
-          </a:lnRef>
-          <a:fillRef idx="0">
-            <a:schemeClr val="accent2"/>
-          </a:fillRef>
-          <a:effectRef idx="2">
-            <a:schemeClr val="accent2"/>
-          </a:effectRef>
-          <a:fontRef idx="minor">
-            <a:schemeClr val="tx1"/>
-          </a:fontRef>
-        </p:style>
-      </p:cxnSp>
       <p:sp>
         <p:nvSpPr>
           <p:cNvPr id="153" name="Rectángulo 152">
@@ -3583,7 +3388,60 @@
         </p:nvSpPr>
         <p:spPr>
           <a:xfrm>
-            <a:off x="1978870" y="726455"/>
+            <a:off x="1967090" y="780516"/>
+            <a:ext cx="4695824" cy="1097121"/>
+          </a:xfrm>
+          <a:prstGeom prst="rect">
+            <a:avLst/>
+          </a:prstGeom>
+          <a:noFill/>
+          <a:ln w="6350">
+            <a:solidFill>
+              <a:schemeClr val="tx1"/>
+            </a:solidFill>
+            <a:prstDash val="dash"/>
+          </a:ln>
+        </p:spPr>
+        <p:style>
+          <a:lnRef idx="2">
+            <a:schemeClr val="accent1">
+              <a:shade val="50000"/>
+            </a:schemeClr>
+          </a:lnRef>
+          <a:fillRef idx="1">
+            <a:schemeClr val="accent1"/>
+          </a:fillRef>
+          <a:effectRef idx="0">
+            <a:schemeClr val="accent1"/>
+          </a:effectRef>
+          <a:fontRef idx="minor">
+            <a:schemeClr val="lt1"/>
+          </a:fontRef>
+        </p:style>
+        <p:txBody>
+          <a:bodyPr rtlCol="0" anchor="ctr"/>
+          <a:lstStyle/>
+          <a:p>
+            <a:pPr algn="ctr"/>
+            <a:endParaRPr lang="es-CL"/>
+          </a:p>
+        </p:txBody>
+      </p:sp>
+      <p:sp>
+        <p:nvSpPr>
+          <p:cNvPr id="161" name="Rectángulo 160">
+            <a:extLst>
+              <a:ext uri="{FF2B5EF4-FFF2-40B4-BE49-F238E27FC236}">
+                <a16:creationId xmlns:a16="http://schemas.microsoft.com/office/drawing/2014/main" id="{1271A5F1-78C8-4691-A148-31B26E1F8A30}"/>
+              </a:ext>
+            </a:extLst>
+          </p:cNvPr>
+          <p:cNvSpPr/>
+          <p:nvPr/>
+        </p:nvSpPr>
+        <p:spPr>
+          <a:xfrm>
+            <a:off x="1957477" y="2270755"/>
             <a:ext cx="4695824" cy="1097121"/>
           </a:xfrm>
           <a:prstGeom prst="rect">
@@ -3624,10 +3482,10 @@
       </p:sp>
       <p:sp>
         <p:nvSpPr>
-          <p:cNvPr id="159" name="Rectángulo 158">
+          <p:cNvPr id="165" name="Rectángulo 164">
             <a:extLst>
               <a:ext uri="{FF2B5EF4-FFF2-40B4-BE49-F238E27FC236}">
-                <a16:creationId xmlns:a16="http://schemas.microsoft.com/office/drawing/2014/main" id="{F70DC47F-4906-4A10-81EC-B5A376DE96C3}"/>
+                <a16:creationId xmlns:a16="http://schemas.microsoft.com/office/drawing/2014/main" id="{B80D2382-8736-45C6-9459-84CBEAE9E76A}"/>
               </a:ext>
             </a:extLst>
           </p:cNvPr>
@@ -3636,7 +3494,7 @@
         </p:nvSpPr>
         <p:spPr>
           <a:xfrm>
-            <a:off x="3403237" y="549243"/>
+            <a:off x="3416568" y="642352"/>
             <a:ext cx="1534753" cy="354423"/>
           </a:xfrm>
           <a:prstGeom prst="rect">
@@ -3670,70 +3528,62 @@
                 <a:latin typeface="Times New Roman" panose="02020603050405020304" pitchFamily="18" charset="0"/>
                 <a:cs typeface="Times New Roman" panose="02020603050405020304" pitchFamily="18" charset="0"/>
               </a:rPr>
-              <a:t>Reproducción normativa</a:t>
-            </a:r>
-          </a:p>
-        </p:txBody>
-      </p:sp>
-      <p:sp>
-        <p:nvSpPr>
-          <p:cNvPr id="161" name="Rectángulo 160">
+              <a:t>Transmisión de habilidades</a:t>
+            </a:r>
+          </a:p>
+        </p:txBody>
+      </p:sp>
+      <p:sp>
+        <p:nvSpPr>
+          <p:cNvPr id="167" name="CuadroTexto 166">
             <a:extLst>
               <a:ext uri="{FF2B5EF4-FFF2-40B4-BE49-F238E27FC236}">
-                <a16:creationId xmlns:a16="http://schemas.microsoft.com/office/drawing/2014/main" id="{1271A5F1-78C8-4691-A148-31B26E1F8A30}"/>
+                <a16:creationId xmlns:a16="http://schemas.microsoft.com/office/drawing/2014/main" id="{287B2643-FAED-4551-BBCC-051420E35606}"/>
               </a:ext>
             </a:extLst>
           </p:cNvPr>
-          <p:cNvSpPr/>
+          <p:cNvSpPr txBox="1"/>
           <p:nvPr/>
         </p:nvSpPr>
         <p:spPr>
           <a:xfrm>
-            <a:off x="1928902" y="2235037"/>
-            <a:ext cx="4695824" cy="1097121"/>
+            <a:off x="-235944" y="360441"/>
+            <a:ext cx="2362200" cy="369332"/>
           </a:xfrm>
           <a:prstGeom prst="rect">
             <a:avLst/>
           </a:prstGeom>
           <a:noFill/>
           <a:ln>
-            <a:solidFill>
-              <a:schemeClr val="tx1"/>
-            </a:solidFill>
-            <a:prstDash val="dash"/>
+            <a:noFill/>
           </a:ln>
         </p:spPr>
-        <p:style>
-          <a:lnRef idx="2">
-            <a:schemeClr val="accent1">
-              <a:shade val="50000"/>
-            </a:schemeClr>
-          </a:lnRef>
-          <a:fillRef idx="1">
-            <a:schemeClr val="accent1"/>
-          </a:fillRef>
-          <a:effectRef idx="0">
-            <a:schemeClr val="accent1"/>
-          </a:effectRef>
-          <a:fontRef idx="minor">
-            <a:schemeClr val="lt1"/>
-          </a:fontRef>
-        </p:style>
-        <p:txBody>
-          <a:bodyPr rtlCol="0" anchor="ctr"/>
+        <p:txBody>
+          <a:bodyPr wrap="square" rtlCol="0">
+            <a:spAutoFit/>
+          </a:bodyPr>
           <a:lstStyle/>
           <a:p>
             <a:pPr algn="ctr"/>
-            <a:endParaRPr lang="es-CL"/>
-          </a:p>
-        </p:txBody>
-      </p:sp>
-      <p:sp>
-        <p:nvSpPr>
-          <p:cNvPr id="165" name="Rectángulo 164">
+            <a:r>
+              <a:rPr lang="es-CL" u="sng" dirty="0">
+                <a:solidFill>
+                  <a:schemeClr val="dk1"/>
+                </a:solidFill>
+                <a:latin typeface="Times New Roman" panose="02020603050405020304" pitchFamily="18" charset="0"/>
+                <a:cs typeface="Times New Roman" panose="02020603050405020304" pitchFamily="18" charset="0"/>
+              </a:rPr>
+              <a:t>Propuesta teórica</a:t>
+            </a:r>
+          </a:p>
+        </p:txBody>
+      </p:sp>
+      <p:sp>
+        <p:nvSpPr>
+          <p:cNvPr id="28" name="Rectángulo 27">
             <a:extLst>
               <a:ext uri="{FF2B5EF4-FFF2-40B4-BE49-F238E27FC236}">
-                <a16:creationId xmlns:a16="http://schemas.microsoft.com/office/drawing/2014/main" id="{B80D2382-8736-45C6-9459-84CBEAE9E76A}"/>
+                <a16:creationId xmlns:a16="http://schemas.microsoft.com/office/drawing/2014/main" id="{EC14670D-1C4A-410E-853A-2459BA33DC38}"/>
               </a:ext>
             </a:extLst>
           </p:cNvPr>
@@ -3742,7 +3592,7 @@
         </p:nvSpPr>
         <p:spPr>
           <a:xfrm>
-            <a:off x="3403237" y="3154944"/>
+            <a:off x="3416568" y="3190664"/>
             <a:ext cx="1534753" cy="354423"/>
           </a:xfrm>
           <a:prstGeom prst="rect">
@@ -3776,52 +3626,7 @@
                 <a:latin typeface="Times New Roman" panose="02020603050405020304" pitchFamily="18" charset="0"/>
                 <a:cs typeface="Times New Roman" panose="02020603050405020304" pitchFamily="18" charset="0"/>
               </a:rPr>
-              <a:t>Transmisión de habilidades</a:t>
-            </a:r>
-          </a:p>
-        </p:txBody>
-      </p:sp>
-      <p:sp>
-        <p:nvSpPr>
-          <p:cNvPr id="167" name="CuadroTexto 166">
-            <a:extLst>
-              <a:ext uri="{FF2B5EF4-FFF2-40B4-BE49-F238E27FC236}">
-                <a16:creationId xmlns:a16="http://schemas.microsoft.com/office/drawing/2014/main" id="{287B2643-FAED-4551-BBCC-051420E35606}"/>
-              </a:ext>
-            </a:extLst>
-          </p:cNvPr>
-          <p:cNvSpPr txBox="1"/>
-          <p:nvPr/>
-        </p:nvSpPr>
-        <p:spPr>
-          <a:xfrm>
-            <a:off x="-321669" y="-39609"/>
-            <a:ext cx="2362200" cy="369332"/>
-          </a:xfrm>
-          <a:prstGeom prst="rect">
-            <a:avLst/>
-          </a:prstGeom>
-          <a:noFill/>
-          <a:ln>
-            <a:noFill/>
-          </a:ln>
-        </p:spPr>
-        <p:txBody>
-          <a:bodyPr wrap="square" rtlCol="0">
-            <a:spAutoFit/>
-          </a:bodyPr>
-          <a:lstStyle/>
-          <a:p>
-            <a:pPr algn="ctr"/>
-            <a:r>
-              <a:rPr lang="es-CL" u="sng" dirty="0">
-                <a:solidFill>
-                  <a:schemeClr val="dk1"/>
-                </a:solidFill>
-                <a:latin typeface="Times New Roman" panose="02020603050405020304" pitchFamily="18" charset="0"/>
-                <a:cs typeface="Times New Roman" panose="02020603050405020304" pitchFamily="18" charset="0"/>
-              </a:rPr>
-              <a:t>Propuesta teórica</a:t>
+              <a:t>Reproducción normativa</a:t>
             </a:r>
           </a:p>
         </p:txBody>

</xml_diff>